<commit_message>
Fix sem1-les11 presentation coloring
</commit_message>
<xml_diff>
--- a/lessons/sem01/lesson11/oop.pptx
+++ b/lessons/sem01/lesson11/oop.pptx
@@ -42400,7 +42400,29 @@
                 <a:latin typeface="Consolas" panose="020B0609020204030204" charset="0"/>
                 <a:cs typeface="Consolas" panose="020B0609020204030204" charset="0"/>
               </a:rPr>
-              <a:t>("parallelogram area")</a:t>
+              <a:t>(</a:t>
+            </a:r>
+            <a:r>
+              <a:rPr lang="en-US" altLang="ru-RU" sz="5400">
+                <a:solidFill>
+                  <a:schemeClr val="accent4">
+                    <a:lumMod val="50000"/>
+                  </a:schemeClr>
+                </a:solidFill>
+                <a:latin typeface="Consolas" panose="020B0609020204030204" charset="0"/>
+                <a:cs typeface="Consolas" panose="020B0609020204030204" charset="0"/>
+              </a:rPr>
+              <a:t>"parallelogram area"</a:t>
+            </a:r>
+            <a:r>
+              <a:rPr lang="en-US" altLang="ru-RU" sz="5400">
+                <a:solidFill>
+                  <a:schemeClr val="accent1"/>
+                </a:solidFill>
+                <a:latin typeface="Consolas" panose="020B0609020204030204" charset="0"/>
+                <a:cs typeface="Consolas" panose="020B0609020204030204" charset="0"/>
+              </a:rPr>
+              <a:t>)</a:t>
             </a:r>
             <a:endParaRPr lang="en-US" altLang="ru-RU" sz="5400">
               <a:latin typeface="Consolas" panose="020B0609020204030204" charset="0"/>

</xml_diff>